<commit_message>
Agregacion de Imagenes al principal
</commit_message>
<xml_diff>
--- a/Veterinary_System/Modif.pptx
+++ b/Veterinary_System/Modif.pptx
@@ -3059,6 +3059,96 @@
           </a:prstGeom>
         </p:spPr>
       </p:pic>
+      <p:pic>
+        <p:nvPicPr>
+          <p:cNvPr id="2" name="Imagen 1"/>
+          <p:cNvPicPr>
+            <a:picLocks noChangeAspect="1"/>
+          </p:cNvPicPr>
+          <p:nvPr/>
+        </p:nvPicPr>
+        <p:blipFill>
+          <a:blip r:embed="rId5" cstate="print">
+            <a:extLst>
+              <a:ext uri="{28A0092B-C50C-407E-A947-70E740481C1C}">
+                <a14:useLocalDpi xmlns:a14="http://schemas.microsoft.com/office/drawing/2010/main" val="0"/>
+              </a:ext>
+            </a:extLst>
+          </a:blip>
+          <a:stretch>
+            <a:fillRect/>
+          </a:stretch>
+        </p:blipFill>
+        <p:spPr>
+          <a:xfrm>
+            <a:off x="6236009" y="3843520"/>
+            <a:ext cx="172111" cy="169069"/>
+          </a:xfrm>
+          <a:prstGeom prst="rect">
+            <a:avLst/>
+          </a:prstGeom>
+        </p:spPr>
+      </p:pic>
+      <p:pic>
+        <p:nvPicPr>
+          <p:cNvPr id="3" name="Imagen 2"/>
+          <p:cNvPicPr>
+            <a:picLocks noChangeAspect="1"/>
+          </p:cNvPicPr>
+          <p:nvPr/>
+        </p:nvPicPr>
+        <p:blipFill>
+          <a:blip r:embed="rId6" cstate="print">
+            <a:extLst>
+              <a:ext uri="{28A0092B-C50C-407E-A947-70E740481C1C}">
+                <a14:useLocalDpi xmlns:a14="http://schemas.microsoft.com/office/drawing/2010/main" val="0"/>
+              </a:ext>
+            </a:extLst>
+          </a:blip>
+          <a:stretch>
+            <a:fillRect/>
+          </a:stretch>
+        </p:blipFill>
+        <p:spPr>
+          <a:xfrm>
+            <a:off x="6565076" y="3340600"/>
+            <a:ext cx="172111" cy="172111"/>
+          </a:xfrm>
+          <a:prstGeom prst="rect">
+            <a:avLst/>
+          </a:prstGeom>
+        </p:spPr>
+      </p:pic>
+      <p:pic>
+        <p:nvPicPr>
+          <p:cNvPr id="7" name="Imagen 6"/>
+          <p:cNvPicPr>
+            <a:picLocks noChangeAspect="1"/>
+          </p:cNvPicPr>
+          <p:nvPr/>
+        </p:nvPicPr>
+        <p:blipFill>
+          <a:blip r:embed="rId7" cstate="print">
+            <a:extLst>
+              <a:ext uri="{28A0092B-C50C-407E-A947-70E740481C1C}">
+                <a14:useLocalDpi xmlns:a14="http://schemas.microsoft.com/office/drawing/2010/main" val="0"/>
+              </a:ext>
+            </a:extLst>
+          </a:blip>
+          <a:stretch>
+            <a:fillRect/>
+          </a:stretch>
+        </p:blipFill>
+        <p:spPr>
+          <a:xfrm>
+            <a:off x="6892890" y="3311479"/>
+            <a:ext cx="182896" cy="172111"/>
+          </a:xfrm>
+          <a:prstGeom prst="rect">
+            <a:avLst/>
+          </a:prstGeom>
+        </p:spPr>
+      </p:pic>
     </p:spTree>
     <p:extLst>
       <p:ext uri="{BB962C8B-B14F-4D97-AF65-F5344CB8AC3E}">

</xml_diff>